<commit_message>
Actualizacion de imagenes platilla
</commit_message>
<xml_diff>
--- a/SystemDNS1/img/work/FormatosDePresentacion.pptx
+++ b/SystemDNS1/img/work/FormatosDePresentacion.pptx
@@ -5,8 +5,15 @@
     <p:sldMasterId id="2147483648" r:id="rId1"/>
   </p:sldMasterIdLst>
   <p:sldIdLst>
-    <p:sldId id="256" r:id="rId2"/>
-    <p:sldId id="257" r:id="rId3"/>
+    <p:sldId id="262" r:id="rId2"/>
+    <p:sldId id="260" r:id="rId3"/>
+    <p:sldId id="259" r:id="rId4"/>
+    <p:sldId id="263" r:id="rId5"/>
+    <p:sldId id="256" r:id="rId6"/>
+    <p:sldId id="257" r:id="rId7"/>
+    <p:sldId id="258" r:id="rId8"/>
+    <p:sldId id="261" r:id="rId9"/>
+    <p:sldId id="264" r:id="rId10"/>
   </p:sldIdLst>
   <p:sldSz cx="12192000" cy="6858000"/>
   <p:notesSz cx="6858000" cy="9144000"/>
@@ -105,6 +112,11 @@
       </a:defRPr>
     </a:lvl9pPr>
   </p:defaultTextStyle>
+  <p:extLst>
+    <p:ext uri="{EFAFB233-063F-42B5-8137-9DF3F51BA10A}">
+      <p15:sldGuideLst xmlns:p15="http://schemas.microsoft.com/office/powerpoint/2012/main"/>
+    </p:ext>
+  </p:extLst>
 </p:presentation>
 </file>
 
@@ -239,7 +251,7 @@
           <a:p>
             <a:fld id="{46DF3954-1AC2-4FDF-B191-045406265D9C}" type="datetimeFigureOut">
               <a:rPr lang="es-MX" smtClean="0"/>
-              <a:t>30/05/2019</a:t>
+              <a:t>31/05/2019</a:t>
             </a:fld>
             <a:endParaRPr lang="es-MX"/>
           </a:p>
@@ -409,7 +421,7 @@
           <a:p>
             <a:fld id="{46DF3954-1AC2-4FDF-B191-045406265D9C}" type="datetimeFigureOut">
               <a:rPr lang="es-MX" smtClean="0"/>
-              <a:t>30/05/2019</a:t>
+              <a:t>31/05/2019</a:t>
             </a:fld>
             <a:endParaRPr lang="es-MX"/>
           </a:p>
@@ -589,7 +601,7 @@
           <a:p>
             <a:fld id="{46DF3954-1AC2-4FDF-B191-045406265D9C}" type="datetimeFigureOut">
               <a:rPr lang="es-MX" smtClean="0"/>
-              <a:t>30/05/2019</a:t>
+              <a:t>31/05/2019</a:t>
             </a:fld>
             <a:endParaRPr lang="es-MX"/>
           </a:p>
@@ -759,7 +771,7 @@
           <a:p>
             <a:fld id="{46DF3954-1AC2-4FDF-B191-045406265D9C}" type="datetimeFigureOut">
               <a:rPr lang="es-MX" smtClean="0"/>
-              <a:t>30/05/2019</a:t>
+              <a:t>31/05/2019</a:t>
             </a:fld>
             <a:endParaRPr lang="es-MX"/>
           </a:p>
@@ -1005,7 +1017,7 @@
           <a:p>
             <a:fld id="{46DF3954-1AC2-4FDF-B191-045406265D9C}" type="datetimeFigureOut">
               <a:rPr lang="es-MX" smtClean="0"/>
-              <a:t>30/05/2019</a:t>
+              <a:t>31/05/2019</a:t>
             </a:fld>
             <a:endParaRPr lang="es-MX"/>
           </a:p>
@@ -1237,7 +1249,7 @@
           <a:p>
             <a:fld id="{46DF3954-1AC2-4FDF-B191-045406265D9C}" type="datetimeFigureOut">
               <a:rPr lang="es-MX" smtClean="0"/>
-              <a:t>30/05/2019</a:t>
+              <a:t>31/05/2019</a:t>
             </a:fld>
             <a:endParaRPr lang="es-MX"/>
           </a:p>
@@ -1604,7 +1616,7 @@
           <a:p>
             <a:fld id="{46DF3954-1AC2-4FDF-B191-045406265D9C}" type="datetimeFigureOut">
               <a:rPr lang="es-MX" smtClean="0"/>
-              <a:t>30/05/2019</a:t>
+              <a:t>31/05/2019</a:t>
             </a:fld>
             <a:endParaRPr lang="es-MX"/>
           </a:p>
@@ -1722,7 +1734,7 @@
           <a:p>
             <a:fld id="{46DF3954-1AC2-4FDF-B191-045406265D9C}" type="datetimeFigureOut">
               <a:rPr lang="es-MX" smtClean="0"/>
-              <a:t>30/05/2019</a:t>
+              <a:t>31/05/2019</a:t>
             </a:fld>
             <a:endParaRPr lang="es-MX"/>
           </a:p>
@@ -1817,7 +1829,7 @@
           <a:p>
             <a:fld id="{46DF3954-1AC2-4FDF-B191-045406265D9C}" type="datetimeFigureOut">
               <a:rPr lang="es-MX" smtClean="0"/>
-              <a:t>30/05/2019</a:t>
+              <a:t>31/05/2019</a:t>
             </a:fld>
             <a:endParaRPr lang="es-MX"/>
           </a:p>
@@ -2094,7 +2106,7 @@
           <a:p>
             <a:fld id="{46DF3954-1AC2-4FDF-B191-045406265D9C}" type="datetimeFigureOut">
               <a:rPr lang="es-MX" smtClean="0"/>
-              <a:t>30/05/2019</a:t>
+              <a:t>31/05/2019</a:t>
             </a:fld>
             <a:endParaRPr lang="es-MX"/>
           </a:p>
@@ -2347,7 +2359,7 @@
           <a:p>
             <a:fld id="{46DF3954-1AC2-4FDF-B191-045406265D9C}" type="datetimeFigureOut">
               <a:rPr lang="es-MX" smtClean="0"/>
-              <a:t>30/05/2019</a:t>
+              <a:t>31/05/2019</a:t>
             </a:fld>
             <a:endParaRPr lang="es-MX"/>
           </a:p>
@@ -2560,7 +2572,7 @@
           <a:p>
             <a:fld id="{46DF3954-1AC2-4FDF-B191-045406265D9C}" type="datetimeFigureOut">
               <a:rPr lang="es-MX" smtClean="0"/>
-              <a:t>30/05/2019</a:t>
+              <a:t>31/05/2019</a:t>
             </a:fld>
             <a:endParaRPr lang="es-MX"/>
           </a:p>
@@ -2965,142 +2977,38 @@
           <a:chExt cx="0" cy="0"/>
         </a:xfrm>
       </p:grpSpPr>
-      <p:grpSp>
-        <p:nvGrpSpPr>
-          <p:cNvPr id="13" name="Grupo 12"/>
-          <p:cNvGrpSpPr/>
-          <p:nvPr/>
-        </p:nvGrpSpPr>
-        <p:grpSpPr>
+      <p:sp>
+        <p:nvSpPr>
+          <p:cNvPr id="2" name="Título 1"/>
+          <p:cNvSpPr>
+            <a:spLocks noGrp="1"/>
+          </p:cNvSpPr>
+          <p:nvPr>
+            <p:ph type="title"/>
+          </p:nvPr>
+        </p:nvSpPr>
+        <p:spPr>
           <a:xfrm>
-            <a:off x="1519512" y="13447"/>
-            <a:ext cx="9143999" cy="6858000"/>
-            <a:chOff x="1519512" y="13447"/>
-            <a:chExt cx="9143999" cy="6858000"/>
+            <a:off x="4019550" y="2860675"/>
+            <a:ext cx="10515600" cy="1325563"/>
           </a:xfrm>
-        </p:grpSpPr>
-        <p:pic>
-          <p:nvPicPr>
-            <p:cNvPr id="5" name="Imagen 4"/>
-            <p:cNvPicPr>
-              <a:picLocks noChangeAspect="1"/>
-            </p:cNvPicPr>
-            <p:nvPr/>
-          </p:nvPicPr>
-          <p:blipFill rotWithShape="1">
-            <a:blip r:embed="rId2">
-              <a:extLst>
-                <a:ext uri="{28A0092B-C50C-407E-A947-70E740481C1C}">
-                  <a14:useLocalDpi xmlns:a14="http://schemas.microsoft.com/office/drawing/2010/main" val="0"/>
-                </a:ext>
-              </a:extLst>
-            </a:blip>
-            <a:srcRect t="9586"/>
-            <a:stretch/>
-          </p:blipFill>
-          <p:spPr>
-            <a:xfrm>
-              <a:off x="2222288" y="836022"/>
-              <a:ext cx="5889747" cy="3370218"/>
-            </a:xfrm>
-            <a:prstGeom prst="rect">
-              <a:avLst/>
-            </a:prstGeom>
-          </p:spPr>
-        </p:pic>
-        <p:pic>
-          <p:nvPicPr>
-            <p:cNvPr id="7" name="Imagen 6"/>
-            <p:cNvPicPr>
-              <a:picLocks noChangeAspect="1"/>
-            </p:cNvPicPr>
-            <p:nvPr/>
-          </p:nvPicPr>
-          <p:blipFill rotWithShape="1">
-            <a:blip r:embed="rId2">
-              <a:extLst>
-                <a:ext uri="{28A0092B-C50C-407E-A947-70E740481C1C}">
-                  <a14:useLocalDpi xmlns:a14="http://schemas.microsoft.com/office/drawing/2010/main" val="0"/>
-                </a:ext>
-              </a:extLst>
-            </a:blip>
-            <a:srcRect l="14547" t="10566" r="15635"/>
-            <a:stretch/>
-          </p:blipFill>
-          <p:spPr>
-            <a:xfrm>
-              <a:off x="7140388" y="2625634"/>
-              <a:ext cx="2669818" cy="3370217"/>
-            </a:xfrm>
-            <a:prstGeom prst="rect">
-              <a:avLst/>
-            </a:prstGeom>
-          </p:spPr>
-        </p:pic>
-        <p:pic>
-          <p:nvPicPr>
-            <p:cNvPr id="8" name="Imagen 7"/>
-            <p:cNvPicPr>
-              <a:picLocks noChangeAspect="1"/>
-            </p:cNvPicPr>
-            <p:nvPr/>
-          </p:nvPicPr>
-          <p:blipFill rotWithShape="1">
-            <a:blip r:embed="rId3" cstate="print">
-              <a:extLst>
-                <a:ext uri="{28A0092B-C50C-407E-A947-70E740481C1C}">
-                  <a14:useLocalDpi xmlns:a14="http://schemas.microsoft.com/office/drawing/2010/main" val="0"/>
-                </a:ext>
-              </a:extLst>
-            </a:blip>
-            <a:srcRect l="15772" t="10155" r="16617"/>
-            <a:stretch/>
-          </p:blipFill>
-          <p:spPr>
-            <a:xfrm>
-              <a:off x="9345705" y="4491318"/>
-              <a:ext cx="1143001" cy="1855694"/>
-            </a:xfrm>
-            <a:prstGeom prst="rect">
-              <a:avLst/>
-            </a:prstGeom>
-          </p:spPr>
-        </p:pic>
-        <p:pic>
-          <p:nvPicPr>
-            <p:cNvPr id="4" name="Imagen 3"/>
-            <p:cNvPicPr>
-              <a:picLocks noChangeAspect="1"/>
-            </p:cNvPicPr>
-            <p:nvPr/>
-          </p:nvPicPr>
-          <p:blipFill>
-            <a:blip r:embed="rId4">
-              <a:extLst>
-                <a:ext uri="{28A0092B-C50C-407E-A947-70E740481C1C}">
-                  <a14:useLocalDpi xmlns:a14="http://schemas.microsoft.com/office/drawing/2010/main" val="0"/>
-                </a:ext>
-              </a:extLst>
-            </a:blip>
-            <a:stretch>
-              <a:fillRect/>
-            </a:stretch>
-          </p:blipFill>
-          <p:spPr>
-            <a:xfrm>
-              <a:off x="1519512" y="13447"/>
-              <a:ext cx="9143999" cy="6858000"/>
-            </a:xfrm>
-            <a:prstGeom prst="rect">
-              <a:avLst/>
-            </a:prstGeom>
-          </p:spPr>
-        </p:pic>
-      </p:grpSp>
+        </p:spPr>
+        <p:txBody>
+          <a:bodyPr/>
+          <a:lstStyle/>
+          <a:p>
+            <a:r>
+              <a:rPr lang="es-MX" dirty="0" smtClean="0"/>
+              <a:t>Imágenes Formato</a:t>
+            </a:r>
+            <a:endParaRPr lang="es-MX" dirty="0"/>
+          </a:p>
+        </p:txBody>
+      </p:sp>
     </p:spTree>
     <p:extLst>
       <p:ext uri="{BB962C8B-B14F-4D97-AF65-F5344CB8AC3E}">
-        <p14:creationId xmlns:p14="http://schemas.microsoft.com/office/powerpoint/2010/main" val="2739836003"/>
+        <p14:creationId xmlns:p14="http://schemas.microsoft.com/office/powerpoint/2010/main" val="1235581735"/>
       </p:ext>
     </p:extLst>
   </p:cSld>
@@ -3127,23 +3035,872 @@
           <a:chExt cx="0" cy="0"/>
         </a:xfrm>
       </p:grpSpPr>
+      <p:sp>
+        <p:nvSpPr>
+          <p:cNvPr id="9" name="Rectángulo 8"/>
+          <p:cNvSpPr/>
+          <p:nvPr/>
+        </p:nvSpPr>
+        <p:spPr>
+          <a:xfrm>
+            <a:off x="0" y="0"/>
+            <a:ext cx="12192000" cy="6858000"/>
+          </a:xfrm>
+          <a:prstGeom prst="rect">
+            <a:avLst/>
+          </a:prstGeom>
+        </p:spPr>
+        <p:style>
+          <a:lnRef idx="2">
+            <a:schemeClr val="accent1">
+              <a:shade val="50000"/>
+            </a:schemeClr>
+          </a:lnRef>
+          <a:fillRef idx="1">
+            <a:schemeClr val="accent1"/>
+          </a:fillRef>
+          <a:effectRef idx="0">
+            <a:schemeClr val="accent1"/>
+          </a:effectRef>
+          <a:fontRef idx="minor">
+            <a:schemeClr val="lt1"/>
+          </a:fontRef>
+        </p:style>
+        <p:txBody>
+          <a:bodyPr rtlCol="0" anchor="ctr"/>
+          <a:lstStyle/>
+          <a:p>
+            <a:pPr algn="ctr"/>
+            <a:endParaRPr lang="es-MX"/>
+          </a:p>
+        </p:txBody>
+      </p:sp>
+      <p:pic>
+        <p:nvPicPr>
+          <p:cNvPr id="4" name="Imagen 3"/>
+          <p:cNvPicPr>
+            <a:picLocks noChangeAspect="1"/>
+          </p:cNvPicPr>
+          <p:nvPr/>
+        </p:nvPicPr>
+        <p:blipFill>
+          <a:blip r:embed="rId2">
+            <a:extLst>
+              <a:ext uri="{BEBA8EAE-BF5A-486C-A8C5-ECC9F3942E4B}">
+                <a14:imgProps xmlns:a14="http://schemas.microsoft.com/office/drawing/2010/main">
+                  <a14:imgLayer r:embed="rId3">
+                    <a14:imgEffect>
+                      <a14:backgroundRemoval t="3691" b="97715" l="9953" r="89929"/>
+                    </a14:imgEffect>
+                  </a14:imgLayer>
+                </a14:imgProps>
+              </a:ext>
+              <a:ext uri="{28A0092B-C50C-407E-A947-70E740481C1C}">
+                <a14:useLocalDpi xmlns:a14="http://schemas.microsoft.com/office/drawing/2010/main" val="0"/>
+              </a:ext>
+            </a:extLst>
+          </a:blip>
+          <a:stretch>
+            <a:fillRect/>
+          </a:stretch>
+        </p:blipFill>
+        <p:spPr>
+          <a:xfrm>
+            <a:off x="798287" y="232229"/>
+            <a:ext cx="8737600" cy="6241142"/>
+          </a:xfrm>
+          <a:prstGeom prst="rect">
+            <a:avLst/>
+          </a:prstGeom>
+        </p:spPr>
+      </p:pic>
+    </p:spTree>
+    <p:extLst>
+      <p:ext uri="{BB962C8B-B14F-4D97-AF65-F5344CB8AC3E}">
+        <p14:creationId xmlns:p14="http://schemas.microsoft.com/office/powerpoint/2010/main" val="3133339016"/>
+      </p:ext>
+    </p:extLst>
+  </p:cSld>
+  <p:clrMapOvr>
+    <a:masterClrMapping/>
+  </p:clrMapOvr>
+</p:sld>
+</file>
+
+<file path=ppt/slides/slide3.xml><?xml version="1.0" encoding="utf-8"?>
+<p:sld xmlns:a="http://schemas.openxmlformats.org/drawingml/2006/main" xmlns:r="http://schemas.openxmlformats.org/officeDocument/2006/relationships" xmlns:p="http://schemas.openxmlformats.org/presentationml/2006/main">
+  <p:cSld>
+    <p:spTree>
+      <p:nvGrpSpPr>
+        <p:cNvPr id="1" name=""/>
+        <p:cNvGrpSpPr/>
+        <p:nvPr/>
+      </p:nvGrpSpPr>
+      <p:grpSpPr>
+        <a:xfrm>
+          <a:off x="0" y="0"/>
+          <a:ext cx="0" cy="0"/>
+          <a:chOff x="0" y="0"/>
+          <a:chExt cx="0" cy="0"/>
+        </a:xfrm>
+      </p:grpSpPr>
+      <p:sp>
+        <p:nvSpPr>
+          <p:cNvPr id="7" name="Rectángulo 6"/>
+          <p:cNvSpPr/>
+          <p:nvPr/>
+        </p:nvSpPr>
+        <p:spPr>
+          <a:xfrm>
+            <a:off x="0" y="0"/>
+            <a:ext cx="12192000" cy="6858000"/>
+          </a:xfrm>
+          <a:prstGeom prst="rect">
+            <a:avLst/>
+          </a:prstGeom>
+        </p:spPr>
+        <p:style>
+          <a:lnRef idx="2">
+            <a:schemeClr val="accent1">
+              <a:shade val="50000"/>
+            </a:schemeClr>
+          </a:lnRef>
+          <a:fillRef idx="1">
+            <a:schemeClr val="accent1"/>
+          </a:fillRef>
+          <a:effectRef idx="0">
+            <a:schemeClr val="accent1"/>
+          </a:effectRef>
+          <a:fontRef idx="minor">
+            <a:schemeClr val="lt1"/>
+          </a:fontRef>
+        </p:style>
+        <p:txBody>
+          <a:bodyPr rtlCol="0" anchor="ctr"/>
+          <a:lstStyle/>
+          <a:p>
+            <a:pPr algn="ctr"/>
+            <a:endParaRPr lang="es-MX"/>
+          </a:p>
+        </p:txBody>
+      </p:sp>
+      <p:pic>
+        <p:nvPicPr>
+          <p:cNvPr id="4" name="Imagen 3"/>
+          <p:cNvPicPr>
+            <a:picLocks noChangeAspect="1"/>
+          </p:cNvPicPr>
+          <p:nvPr/>
+        </p:nvPicPr>
+        <p:blipFill>
+          <a:blip r:embed="rId2">
+            <a:extLst>
+              <a:ext uri="{28A0092B-C50C-407E-A947-70E740481C1C}">
+                <a14:useLocalDpi xmlns:a14="http://schemas.microsoft.com/office/drawing/2010/main" val="0"/>
+              </a:ext>
+            </a:extLst>
+          </a:blip>
+          <a:stretch>
+            <a:fillRect/>
+          </a:stretch>
+        </p:blipFill>
+        <p:spPr>
+          <a:xfrm>
+            <a:off x="1524000" y="0"/>
+            <a:ext cx="9143999" cy="6858000"/>
+          </a:xfrm>
+          <a:prstGeom prst="rect">
+            <a:avLst/>
+          </a:prstGeom>
+        </p:spPr>
+      </p:pic>
+      <p:pic>
+        <p:nvPicPr>
+          <p:cNvPr id="5" name="Imagen 4"/>
+          <p:cNvPicPr>
+            <a:picLocks noChangeAspect="1"/>
+          </p:cNvPicPr>
+          <p:nvPr/>
+        </p:nvPicPr>
+        <p:blipFill rotWithShape="1">
+          <a:blip r:embed="rId3">
+            <a:extLst>
+              <a:ext uri="{BEBA8EAE-BF5A-486C-A8C5-ECC9F3942E4B}">
+                <a14:imgProps xmlns:a14="http://schemas.microsoft.com/office/drawing/2010/main">
+                  <a14:imgLayer r:embed="rId4">
+                    <a14:imgEffect>
+                      <a14:backgroundRemoval t="72408" b="82250" l="3910" r="90403"/>
+                    </a14:imgEffect>
+                  </a14:imgLayer>
+                </a14:imgProps>
+              </a:ext>
+              <a:ext uri="{28A0092B-C50C-407E-A947-70E740481C1C}">
+                <a14:useLocalDpi xmlns:a14="http://schemas.microsoft.com/office/drawing/2010/main" val="0"/>
+              </a:ext>
+            </a:extLst>
+          </a:blip>
+          <a:srcRect l="12480" t="71969" r="13974" b="18512"/>
+          <a:stretch/>
+        </p:blipFill>
+        <p:spPr>
+          <a:xfrm>
+            <a:off x="1881980" y="4531519"/>
+            <a:ext cx="4945063" cy="774700"/>
+          </a:xfrm>
+          <a:prstGeom prst="rect">
+            <a:avLst/>
+          </a:prstGeom>
+        </p:spPr>
+      </p:pic>
+    </p:spTree>
+    <p:extLst>
+      <p:ext uri="{BB962C8B-B14F-4D97-AF65-F5344CB8AC3E}">
+        <p14:creationId xmlns:p14="http://schemas.microsoft.com/office/powerpoint/2010/main" val="1245413728"/>
+      </p:ext>
+    </p:extLst>
+  </p:cSld>
+  <p:clrMapOvr>
+    <a:masterClrMapping/>
+  </p:clrMapOvr>
+</p:sld>
+</file>
+
+<file path=ppt/slides/slide4.xml><?xml version="1.0" encoding="utf-8"?>
+<p:sld xmlns:a="http://schemas.openxmlformats.org/drawingml/2006/main" xmlns:r="http://schemas.openxmlformats.org/officeDocument/2006/relationships" xmlns:p="http://schemas.openxmlformats.org/presentationml/2006/main">
+  <p:cSld>
+    <p:spTree>
+      <p:nvGrpSpPr>
+        <p:cNvPr id="1" name=""/>
+        <p:cNvGrpSpPr/>
+        <p:nvPr/>
+      </p:nvGrpSpPr>
+      <p:grpSpPr>
+        <a:xfrm>
+          <a:off x="0" y="0"/>
+          <a:ext cx="0" cy="0"/>
+          <a:chOff x="0" y="0"/>
+          <a:chExt cx="0" cy="0"/>
+        </a:xfrm>
+      </p:grpSpPr>
+      <p:sp>
+        <p:nvSpPr>
+          <p:cNvPr id="2" name="Título 1"/>
+          <p:cNvSpPr>
+            <a:spLocks noGrp="1"/>
+          </p:cNvSpPr>
+          <p:nvPr>
+            <p:ph type="title"/>
+          </p:nvPr>
+        </p:nvSpPr>
+        <p:spPr>
+          <a:xfrm>
+            <a:off x="5276850" y="2346325"/>
+            <a:ext cx="10515600" cy="1325563"/>
+          </a:xfrm>
+        </p:spPr>
+        <p:txBody>
+          <a:bodyPr/>
+          <a:lstStyle/>
+          <a:p>
+            <a:r>
+              <a:rPr lang="es-MX" dirty="0" smtClean="0"/>
+              <a:t>Diseño</a:t>
+            </a:r>
+            <a:endParaRPr lang="es-MX" dirty="0"/>
+          </a:p>
+        </p:txBody>
+      </p:sp>
+    </p:spTree>
+    <p:extLst>
+      <p:ext uri="{BB962C8B-B14F-4D97-AF65-F5344CB8AC3E}">
+        <p14:creationId xmlns:p14="http://schemas.microsoft.com/office/powerpoint/2010/main" val="3944854421"/>
+      </p:ext>
+    </p:extLst>
+  </p:cSld>
+  <p:clrMapOvr>
+    <a:masterClrMapping/>
+  </p:clrMapOvr>
+</p:sld>
+</file>
+
+<file path=ppt/slides/slide5.xml><?xml version="1.0" encoding="utf-8"?>
+<p:sld xmlns:a="http://schemas.openxmlformats.org/drawingml/2006/main" xmlns:r="http://schemas.openxmlformats.org/officeDocument/2006/relationships" xmlns:p="http://schemas.openxmlformats.org/presentationml/2006/main">
+  <p:cSld>
+    <p:spTree>
+      <p:nvGrpSpPr>
+        <p:cNvPr id="1" name=""/>
+        <p:cNvGrpSpPr/>
+        <p:nvPr/>
+      </p:nvGrpSpPr>
+      <p:grpSpPr>
+        <a:xfrm>
+          <a:off x="0" y="0"/>
+          <a:ext cx="0" cy="0"/>
+          <a:chOff x="0" y="0"/>
+          <a:chExt cx="0" cy="0"/>
+        </a:xfrm>
+      </p:grpSpPr>
       <p:grpSp>
         <p:nvGrpSpPr>
-          <p:cNvPr id="10" name="Grupo 9"/>
+          <p:cNvPr id="2" name="Grupo 1"/>
           <p:cNvGrpSpPr/>
           <p:nvPr/>
         </p:nvGrpSpPr>
         <p:grpSpPr>
           <a:xfrm>
-            <a:off x="3800475" y="2147887"/>
-            <a:ext cx="5143500" cy="3467100"/>
-            <a:chOff x="3800475" y="2147887"/>
-            <a:chExt cx="5143500" cy="3467100"/>
+            <a:off x="1519512" y="13447"/>
+            <a:ext cx="9143999" cy="6858000"/>
+            <a:chOff x="1519512" y="13447"/>
+            <a:chExt cx="9143999" cy="6858000"/>
+          </a:xfrm>
+        </p:grpSpPr>
+        <p:grpSp>
+          <p:nvGrpSpPr>
+            <p:cNvPr id="13" name="Grupo 12"/>
+            <p:cNvGrpSpPr/>
+            <p:nvPr/>
+          </p:nvGrpSpPr>
+          <p:grpSpPr>
+            <a:xfrm>
+              <a:off x="1519512" y="13447"/>
+              <a:ext cx="9143999" cy="6858000"/>
+              <a:chOff x="1519512" y="13447"/>
+              <a:chExt cx="9143999" cy="6858000"/>
+            </a:xfrm>
+          </p:grpSpPr>
+          <p:pic>
+            <p:nvPicPr>
+              <p:cNvPr id="5" name="Imagen 4"/>
+              <p:cNvPicPr>
+                <a:picLocks noChangeAspect="1"/>
+              </p:cNvPicPr>
+              <p:nvPr/>
+            </p:nvPicPr>
+            <p:blipFill rotWithShape="1">
+              <a:blip r:embed="rId2">
+                <a:extLst>
+                  <a:ext uri="{28A0092B-C50C-407E-A947-70E740481C1C}">
+                    <a14:useLocalDpi xmlns:a14="http://schemas.microsoft.com/office/drawing/2010/main" val="0"/>
+                  </a:ext>
+                </a:extLst>
+              </a:blip>
+              <a:srcRect t="9586"/>
+              <a:stretch/>
+            </p:blipFill>
+            <p:spPr>
+              <a:xfrm>
+                <a:off x="2222288" y="836022"/>
+                <a:ext cx="5889747" cy="3370218"/>
+              </a:xfrm>
+              <a:prstGeom prst="rect">
+                <a:avLst/>
+              </a:prstGeom>
+            </p:spPr>
+          </p:pic>
+          <p:pic>
+            <p:nvPicPr>
+              <p:cNvPr id="7" name="Imagen 6"/>
+              <p:cNvPicPr>
+                <a:picLocks noChangeAspect="1"/>
+              </p:cNvPicPr>
+              <p:nvPr/>
+            </p:nvPicPr>
+            <p:blipFill rotWithShape="1">
+              <a:blip r:embed="rId2">
+                <a:extLst>
+                  <a:ext uri="{28A0092B-C50C-407E-A947-70E740481C1C}">
+                    <a14:useLocalDpi xmlns:a14="http://schemas.microsoft.com/office/drawing/2010/main" val="0"/>
+                  </a:ext>
+                </a:extLst>
+              </a:blip>
+              <a:srcRect l="14547" t="10566" r="15635"/>
+              <a:stretch/>
+            </p:blipFill>
+            <p:spPr>
+              <a:xfrm>
+                <a:off x="7140388" y="2625634"/>
+                <a:ext cx="2669818" cy="3370217"/>
+              </a:xfrm>
+              <a:prstGeom prst="rect">
+                <a:avLst/>
+              </a:prstGeom>
+            </p:spPr>
+          </p:pic>
+          <p:pic>
+            <p:nvPicPr>
+              <p:cNvPr id="8" name="Imagen 7"/>
+              <p:cNvPicPr>
+                <a:picLocks noChangeAspect="1"/>
+              </p:cNvPicPr>
+              <p:nvPr/>
+            </p:nvPicPr>
+            <p:blipFill rotWithShape="1">
+              <a:blip r:embed="rId3" cstate="print">
+                <a:extLst>
+                  <a:ext uri="{28A0092B-C50C-407E-A947-70E740481C1C}">
+                    <a14:useLocalDpi xmlns:a14="http://schemas.microsoft.com/office/drawing/2010/main" val="0"/>
+                  </a:ext>
+                </a:extLst>
+              </a:blip>
+              <a:srcRect l="15772" t="10155" r="16617"/>
+              <a:stretch/>
+            </p:blipFill>
+            <p:spPr>
+              <a:xfrm>
+                <a:off x="9345705" y="4491318"/>
+                <a:ext cx="1143001" cy="1855694"/>
+              </a:xfrm>
+              <a:prstGeom prst="rect">
+                <a:avLst/>
+              </a:prstGeom>
+            </p:spPr>
+          </p:pic>
+          <p:pic>
+            <p:nvPicPr>
+              <p:cNvPr id="4" name="Imagen 3"/>
+              <p:cNvPicPr>
+                <a:picLocks noChangeAspect="1"/>
+              </p:cNvPicPr>
+              <p:nvPr/>
+            </p:nvPicPr>
+            <p:blipFill>
+              <a:blip r:embed="rId4">
+                <a:extLst>
+                  <a:ext uri="{28A0092B-C50C-407E-A947-70E740481C1C}">
+                    <a14:useLocalDpi xmlns:a14="http://schemas.microsoft.com/office/drawing/2010/main" val="0"/>
+                  </a:ext>
+                </a:extLst>
+              </a:blip>
+              <a:stretch>
+                <a:fillRect/>
+              </a:stretch>
+            </p:blipFill>
+            <p:spPr>
+              <a:xfrm>
+                <a:off x="1519512" y="13447"/>
+                <a:ext cx="9143999" cy="6858000"/>
+              </a:xfrm>
+              <a:prstGeom prst="rect">
+                <a:avLst/>
+              </a:prstGeom>
+            </p:spPr>
+          </p:pic>
+        </p:grpSp>
+        <p:pic>
+          <p:nvPicPr>
+            <p:cNvPr id="10" name="Imagen 9"/>
+            <p:cNvPicPr>
+              <a:picLocks noChangeAspect="1"/>
+            </p:cNvPicPr>
+            <p:nvPr/>
+          </p:nvPicPr>
+          <p:blipFill rotWithShape="1">
+            <a:blip r:embed="rId5">
+              <a:extLst>
+                <a:ext uri="{BEBA8EAE-BF5A-486C-A8C5-ECC9F3942E4B}">
+                  <a14:imgProps xmlns:a14="http://schemas.microsoft.com/office/drawing/2010/main">
+                    <a14:imgLayer r:embed="rId6">
+                      <a14:imgEffect>
+                        <a14:backgroundRemoval t="72408" b="82250" l="3910" r="90403"/>
+                      </a14:imgEffect>
+                    </a14:imgLayer>
+                  </a14:imgProps>
+                </a:ext>
+                <a:ext uri="{28A0092B-C50C-407E-A947-70E740481C1C}">
+                  <a14:useLocalDpi xmlns:a14="http://schemas.microsoft.com/office/drawing/2010/main" val="0"/>
+                </a:ext>
+              </a:extLst>
+            </a:blip>
+            <a:srcRect l="12480" t="71969" r="13974" b="18512"/>
+            <a:stretch/>
+          </p:blipFill>
+          <p:spPr>
+            <a:xfrm>
+              <a:off x="1881980" y="4531519"/>
+              <a:ext cx="4945063" cy="774700"/>
+            </a:xfrm>
+            <a:prstGeom prst="rect">
+              <a:avLst/>
+            </a:prstGeom>
+          </p:spPr>
+        </p:pic>
+      </p:grpSp>
+    </p:spTree>
+    <p:extLst>
+      <p:ext uri="{BB962C8B-B14F-4D97-AF65-F5344CB8AC3E}">
+        <p14:creationId xmlns:p14="http://schemas.microsoft.com/office/powerpoint/2010/main" val="2739836003"/>
+      </p:ext>
+    </p:extLst>
+  </p:cSld>
+  <p:clrMapOvr>
+    <a:masterClrMapping/>
+  </p:clrMapOvr>
+</p:sld>
+</file>
+
+<file path=ppt/slides/slide6.xml><?xml version="1.0" encoding="utf-8"?>
+<p:sld xmlns:a="http://schemas.openxmlformats.org/drawingml/2006/main" xmlns:r="http://schemas.openxmlformats.org/officeDocument/2006/relationships" xmlns:p="http://schemas.openxmlformats.org/presentationml/2006/main">
+  <p:cSld>
+    <p:spTree>
+      <p:nvGrpSpPr>
+        <p:cNvPr id="1" name=""/>
+        <p:cNvGrpSpPr/>
+        <p:nvPr/>
+      </p:nvGrpSpPr>
+      <p:grpSpPr>
+        <a:xfrm>
+          <a:off x="0" y="0"/>
+          <a:ext cx="0" cy="0"/>
+          <a:chOff x="0" y="0"/>
+          <a:chExt cx="0" cy="0"/>
+        </a:xfrm>
+      </p:grpSpPr>
+      <p:grpSp>
+        <p:nvGrpSpPr>
+          <p:cNvPr id="2" name="Grupo 1"/>
+          <p:cNvGrpSpPr/>
+          <p:nvPr/>
+        </p:nvGrpSpPr>
+        <p:grpSpPr>
+          <a:xfrm>
+            <a:off x="1704974" y="353556"/>
+            <a:ext cx="8737600" cy="6241142"/>
+            <a:chOff x="1704974" y="353556"/>
+            <a:chExt cx="8737600" cy="6241142"/>
           </a:xfrm>
         </p:grpSpPr>
         <p:pic>
           <p:nvPicPr>
-            <p:cNvPr id="6" name="Imagen 5"/>
+            <p:cNvPr id="9" name="Imagen 8"/>
+            <p:cNvPicPr>
+              <a:picLocks noChangeAspect="1"/>
+            </p:cNvPicPr>
+            <p:nvPr/>
+          </p:nvPicPr>
+          <p:blipFill>
+            <a:blip r:embed="rId2" cstate="print">
+              <a:extLst>
+                <a:ext uri="{28A0092B-C50C-407E-A947-70E740481C1C}">
+                  <a14:useLocalDpi xmlns:a14="http://schemas.microsoft.com/office/drawing/2010/main" val="0"/>
+                </a:ext>
+              </a:extLst>
+            </a:blip>
+            <a:stretch>
+              <a:fillRect/>
+            </a:stretch>
+          </p:blipFill>
+          <p:spPr>
+            <a:xfrm>
+              <a:off x="3101340" y="922201"/>
+              <a:ext cx="6077189" cy="3565979"/>
+            </a:xfrm>
+            <a:prstGeom prst="rect">
+              <a:avLst/>
+            </a:prstGeom>
+          </p:spPr>
+        </p:pic>
+        <p:pic>
+          <p:nvPicPr>
+            <p:cNvPr id="8" name="Imagen 7"/>
+            <p:cNvPicPr>
+              <a:picLocks noChangeAspect="1"/>
+            </p:cNvPicPr>
+            <p:nvPr/>
+          </p:nvPicPr>
+          <p:blipFill>
+            <a:blip r:embed="rId3">
+              <a:extLst>
+                <a:ext uri="{BEBA8EAE-BF5A-486C-A8C5-ECC9F3942E4B}">
+                  <a14:imgProps xmlns:a14="http://schemas.microsoft.com/office/drawing/2010/main">
+                    <a14:imgLayer r:embed="rId4">
+                      <a14:imgEffect>
+                        <a14:backgroundRemoval t="3691" b="97715" l="9953" r="89929"/>
+                      </a14:imgEffect>
+                    </a14:imgLayer>
+                  </a14:imgProps>
+                </a:ext>
+                <a:ext uri="{28A0092B-C50C-407E-A947-70E740481C1C}">
+                  <a14:useLocalDpi xmlns:a14="http://schemas.microsoft.com/office/drawing/2010/main" val="0"/>
+                </a:ext>
+              </a:extLst>
+            </a:blip>
+            <a:stretch>
+              <a:fillRect/>
+            </a:stretch>
+          </p:blipFill>
+          <p:spPr>
+            <a:xfrm>
+              <a:off x="1704974" y="353556"/>
+              <a:ext cx="8737600" cy="6241142"/>
+            </a:xfrm>
+            <a:prstGeom prst="rect">
+              <a:avLst/>
+            </a:prstGeom>
+          </p:spPr>
+        </p:pic>
+      </p:grpSp>
+    </p:spTree>
+    <p:extLst>
+      <p:ext uri="{BB962C8B-B14F-4D97-AF65-F5344CB8AC3E}">
+        <p14:creationId xmlns:p14="http://schemas.microsoft.com/office/powerpoint/2010/main" val="290116028"/>
+      </p:ext>
+    </p:extLst>
+  </p:cSld>
+  <p:clrMapOvr>
+    <a:masterClrMapping/>
+  </p:clrMapOvr>
+</p:sld>
+</file>
+
+<file path=ppt/slides/slide7.xml><?xml version="1.0" encoding="utf-8"?>
+<p:sld xmlns:a="http://schemas.openxmlformats.org/drawingml/2006/main" xmlns:r="http://schemas.openxmlformats.org/officeDocument/2006/relationships" xmlns:p="http://schemas.openxmlformats.org/presentationml/2006/main">
+  <p:cSld>
+    <p:spTree>
+      <p:nvGrpSpPr>
+        <p:cNvPr id="1" name=""/>
+        <p:cNvGrpSpPr/>
+        <p:nvPr/>
+      </p:nvGrpSpPr>
+      <p:grpSpPr>
+        <a:xfrm>
+          <a:off x="0" y="0"/>
+          <a:ext cx="0" cy="0"/>
+          <a:chOff x="0" y="0"/>
+          <a:chExt cx="0" cy="0"/>
+        </a:xfrm>
+      </p:grpSpPr>
+      <p:grpSp>
+        <p:nvGrpSpPr>
+          <p:cNvPr id="13" name="Grupo 12"/>
+          <p:cNvGrpSpPr/>
+          <p:nvPr/>
+        </p:nvGrpSpPr>
+        <p:grpSpPr>
+          <a:xfrm>
+            <a:off x="1524000" y="0"/>
+            <a:ext cx="9143999" cy="6858000"/>
+            <a:chOff x="1524000" y="0"/>
+            <a:chExt cx="9143999" cy="6858000"/>
+          </a:xfrm>
+        </p:grpSpPr>
+        <p:grpSp>
+          <p:nvGrpSpPr>
+            <p:cNvPr id="9" name="Grupo 8"/>
+            <p:cNvGrpSpPr/>
+            <p:nvPr/>
+          </p:nvGrpSpPr>
+          <p:grpSpPr>
+            <a:xfrm>
+              <a:off x="1524000" y="0"/>
+              <a:ext cx="9143999" cy="6858000"/>
+              <a:chOff x="1524000" y="0"/>
+              <a:chExt cx="9143999" cy="6858000"/>
+            </a:xfrm>
+          </p:grpSpPr>
+          <p:pic>
+            <p:nvPicPr>
+              <p:cNvPr id="8" name="Imagen 7"/>
+              <p:cNvPicPr>
+                <a:picLocks noChangeAspect="1"/>
+              </p:cNvPicPr>
+              <p:nvPr/>
+            </p:nvPicPr>
+            <p:blipFill rotWithShape="1">
+              <a:blip r:embed="rId2">
+                <a:extLst>
+                  <a:ext uri="{28A0092B-C50C-407E-A947-70E740481C1C}">
+                    <a14:useLocalDpi xmlns:a14="http://schemas.microsoft.com/office/drawing/2010/main" val="0"/>
+                  </a:ext>
+                </a:extLst>
+              </a:blip>
+              <a:srcRect t="9322"/>
+              <a:stretch/>
+            </p:blipFill>
+            <p:spPr>
+              <a:xfrm>
+                <a:off x="2200275" y="828675"/>
+                <a:ext cx="5924550" cy="3409950"/>
+              </a:xfrm>
+              <a:prstGeom prst="rect">
+                <a:avLst/>
+              </a:prstGeom>
+            </p:spPr>
+          </p:pic>
+          <p:pic>
+            <p:nvPicPr>
+              <p:cNvPr id="6" name="Imagen 5"/>
+              <p:cNvPicPr>
+                <a:picLocks noChangeAspect="1"/>
+              </p:cNvPicPr>
+              <p:nvPr/>
+            </p:nvPicPr>
+            <p:blipFill rotWithShape="1">
+              <a:blip r:embed="rId2">
+                <a:extLst>
+                  <a:ext uri="{28A0092B-C50C-407E-A947-70E740481C1C}">
+                    <a14:useLocalDpi xmlns:a14="http://schemas.microsoft.com/office/drawing/2010/main" val="0"/>
+                  </a:ext>
+                </a:extLst>
+              </a:blip>
+              <a:srcRect t="9491" r="1705"/>
+              <a:stretch/>
+            </p:blipFill>
+            <p:spPr>
+              <a:xfrm>
+                <a:off x="7127965" y="2579914"/>
+                <a:ext cx="2721430" cy="3546566"/>
+              </a:xfrm>
+              <a:prstGeom prst="rect">
+                <a:avLst/>
+              </a:prstGeom>
+            </p:spPr>
+          </p:pic>
+          <p:pic>
+            <p:nvPicPr>
+              <p:cNvPr id="5" name="Imagen 4"/>
+              <p:cNvPicPr>
+                <a:picLocks noChangeAspect="1"/>
+              </p:cNvPicPr>
+              <p:nvPr/>
+            </p:nvPicPr>
+            <p:blipFill rotWithShape="1">
+              <a:blip r:embed="rId3" cstate="print">
+                <a:extLst>
+                  <a:ext uri="{28A0092B-C50C-407E-A947-70E740481C1C}">
+                    <a14:useLocalDpi xmlns:a14="http://schemas.microsoft.com/office/drawing/2010/main" val="0"/>
+                  </a:ext>
+                </a:extLst>
+              </a:blip>
+              <a:srcRect t="9491" r="1705"/>
+              <a:stretch/>
+            </p:blipFill>
+            <p:spPr>
+              <a:xfrm>
+                <a:off x="9353006" y="4454434"/>
+                <a:ext cx="1136468" cy="1672046"/>
+              </a:xfrm>
+              <a:prstGeom prst="rect">
+                <a:avLst/>
+              </a:prstGeom>
+            </p:spPr>
+          </p:pic>
+          <p:pic>
+            <p:nvPicPr>
+              <p:cNvPr id="4" name="Imagen 3"/>
+              <p:cNvPicPr>
+                <a:picLocks noChangeAspect="1"/>
+              </p:cNvPicPr>
+              <p:nvPr/>
+            </p:nvPicPr>
+            <p:blipFill>
+              <a:blip r:embed="rId4">
+                <a:extLst>
+                  <a:ext uri="{28A0092B-C50C-407E-A947-70E740481C1C}">
+                    <a14:useLocalDpi xmlns:a14="http://schemas.microsoft.com/office/drawing/2010/main" val="0"/>
+                  </a:ext>
+                </a:extLst>
+              </a:blip>
+              <a:stretch>
+                <a:fillRect/>
+              </a:stretch>
+            </p:blipFill>
+            <p:spPr>
+              <a:xfrm>
+                <a:off x="1524000" y="0"/>
+                <a:ext cx="9143999" cy="6858000"/>
+              </a:xfrm>
+              <a:prstGeom prst="rect">
+                <a:avLst/>
+              </a:prstGeom>
+            </p:spPr>
+          </p:pic>
+        </p:grpSp>
+        <p:pic>
+          <p:nvPicPr>
+            <p:cNvPr id="12" name="Imagen 11"/>
+            <p:cNvPicPr>
+              <a:picLocks noChangeAspect="1"/>
+            </p:cNvPicPr>
+            <p:nvPr/>
+          </p:nvPicPr>
+          <p:blipFill rotWithShape="1">
+            <a:blip r:embed="rId5">
+              <a:extLst>
+                <a:ext uri="{BEBA8EAE-BF5A-486C-A8C5-ECC9F3942E4B}">
+                  <a14:imgProps xmlns:a14="http://schemas.microsoft.com/office/drawing/2010/main">
+                    <a14:imgLayer r:embed="rId6">
+                      <a14:imgEffect>
+                        <a14:backgroundRemoval t="72408" b="82250" l="3910" r="90403"/>
+                      </a14:imgEffect>
+                    </a14:imgLayer>
+                  </a14:imgProps>
+                </a:ext>
+                <a:ext uri="{28A0092B-C50C-407E-A947-70E740481C1C}">
+                  <a14:useLocalDpi xmlns:a14="http://schemas.microsoft.com/office/drawing/2010/main" val="0"/>
+                </a:ext>
+              </a:extLst>
+            </a:blip>
+            <a:srcRect l="12480" t="71969" r="13974" b="18512"/>
+            <a:stretch/>
+          </p:blipFill>
+          <p:spPr>
+            <a:xfrm>
+              <a:off x="1881980" y="4531519"/>
+              <a:ext cx="4945063" cy="774700"/>
+            </a:xfrm>
+            <a:prstGeom prst="rect">
+              <a:avLst/>
+            </a:prstGeom>
+          </p:spPr>
+        </p:pic>
+      </p:grpSp>
+    </p:spTree>
+    <p:extLst>
+      <p:ext uri="{BB962C8B-B14F-4D97-AF65-F5344CB8AC3E}">
+        <p14:creationId xmlns:p14="http://schemas.microsoft.com/office/powerpoint/2010/main" val="4181745107"/>
+      </p:ext>
+    </p:extLst>
+  </p:cSld>
+  <p:clrMapOvr>
+    <a:masterClrMapping/>
+  </p:clrMapOvr>
+</p:sld>
+</file>
+
+<file path=ppt/slides/slide8.xml><?xml version="1.0" encoding="utf-8"?>
+<p:sld xmlns:a="http://schemas.openxmlformats.org/drawingml/2006/main" xmlns:r="http://schemas.openxmlformats.org/officeDocument/2006/relationships" xmlns:p="http://schemas.openxmlformats.org/presentationml/2006/main">
+  <p:cSld>
+    <p:spTree>
+      <p:nvGrpSpPr>
+        <p:cNvPr id="1" name=""/>
+        <p:cNvGrpSpPr/>
+        <p:nvPr/>
+      </p:nvGrpSpPr>
+      <p:grpSpPr>
+        <a:xfrm>
+          <a:off x="0" y="0"/>
+          <a:ext cx="0" cy="0"/>
+          <a:chOff x="0" y="0"/>
+          <a:chExt cx="0" cy="0"/>
+        </a:xfrm>
+      </p:grpSpPr>
+      <p:grpSp>
+        <p:nvGrpSpPr>
+          <p:cNvPr id="12" name="Grupo 11"/>
+          <p:cNvGrpSpPr/>
+          <p:nvPr/>
+        </p:nvGrpSpPr>
+        <p:grpSpPr>
+          <a:xfrm>
+            <a:off x="1524000" y="0"/>
+            <a:ext cx="9143999" cy="6858000"/>
+            <a:chOff x="1524000" y="0"/>
+            <a:chExt cx="9143999" cy="6858000"/>
+          </a:xfrm>
+        </p:grpSpPr>
+        <p:pic>
+          <p:nvPicPr>
+            <p:cNvPr id="8" name="Imagen 7"/>
             <p:cNvPicPr>
               <a:picLocks noChangeAspect="1"/>
             </p:cNvPicPr>
@@ -3163,66 +3920,47 @@
           </p:blipFill>
           <p:spPr>
             <a:xfrm>
-              <a:off x="3800475" y="2147887"/>
-              <a:ext cx="5143500" cy="3467100"/>
+              <a:off x="2133600" y="838199"/>
+              <a:ext cx="6057900" cy="3409951"/>
             </a:xfrm>
             <a:prstGeom prst="rect">
               <a:avLst/>
             </a:prstGeom>
           </p:spPr>
         </p:pic>
-        <p:sp>
-          <p:nvSpPr>
-            <p:cNvPr id="7" name="Rectángulo 6"/>
-            <p:cNvSpPr/>
+        <p:pic>
+          <p:nvPicPr>
+            <p:cNvPr id="9" name="Imagen 8"/>
+            <p:cNvPicPr>
+              <a:picLocks noChangeAspect="1"/>
+            </p:cNvPicPr>
             <p:nvPr/>
-          </p:nvSpPr>
+          </p:nvPicPr>
+          <p:blipFill>
+            <a:blip r:embed="rId2">
+              <a:extLst>
+                <a:ext uri="{28A0092B-C50C-407E-A947-70E740481C1C}">
+                  <a14:useLocalDpi xmlns:a14="http://schemas.microsoft.com/office/drawing/2010/main" val="0"/>
+                </a:ext>
+              </a:extLst>
+            </a:blip>
+            <a:stretch>
+              <a:fillRect/>
+            </a:stretch>
+          </p:blipFill>
           <p:spPr>
             <a:xfrm>
-              <a:off x="4629150" y="2476500"/>
-              <a:ext cx="3556000" cy="1955800"/>
+              <a:off x="7165973" y="2614040"/>
+              <a:ext cx="2682877" cy="3424810"/>
             </a:xfrm>
             <a:prstGeom prst="rect">
               <a:avLst/>
             </a:prstGeom>
-            <a:ln>
-              <a:solidFill>
-                <a:schemeClr val="bg1"/>
-              </a:solidFill>
-            </a:ln>
           </p:spPr>
-          <p:style>
-            <a:lnRef idx="2">
-              <a:schemeClr val="accent1"/>
-            </a:lnRef>
-            <a:fillRef idx="1">
-              <a:schemeClr val="lt1"/>
-            </a:fillRef>
-            <a:effectRef idx="0">
-              <a:schemeClr val="accent1"/>
-            </a:effectRef>
-            <a:fontRef idx="minor">
-              <a:schemeClr val="dk1"/>
-            </a:fontRef>
-          </p:style>
-          <p:txBody>
-            <a:bodyPr rtlCol="0" anchor="ctr"/>
-            <a:lstStyle/>
-            <a:p>
-              <a:pPr algn="ctr"/>
-              <a:endParaRPr lang="es-MX">
-                <a:ln>
-                  <a:solidFill>
-                    <a:schemeClr val="tx1"/>
-                  </a:solidFill>
-                </a:ln>
-              </a:endParaRPr>
-            </a:p>
-          </p:txBody>
-        </p:sp>
+        </p:pic>
         <p:pic>
           <p:nvPicPr>
-            <p:cNvPr id="9" name="Imagen 8"/>
+            <p:cNvPr id="7" name="Imagen 6"/>
             <p:cNvPicPr>
               <a:picLocks noChangeAspect="1"/>
             </p:cNvPicPr>
@@ -3242,8 +3980,76 @@
           </p:blipFill>
           <p:spPr>
             <a:xfrm>
-              <a:off x="4629151" y="2476500"/>
-              <a:ext cx="3556000" cy="1965325"/>
+              <a:off x="9372599" y="4457700"/>
+              <a:ext cx="1076325" cy="1714500"/>
+            </a:xfrm>
+            <a:prstGeom prst="rect">
+              <a:avLst/>
+            </a:prstGeom>
+          </p:spPr>
+        </p:pic>
+        <p:pic>
+          <p:nvPicPr>
+            <p:cNvPr id="5" name="Imagen 4"/>
+            <p:cNvPicPr>
+              <a:picLocks noChangeAspect="1"/>
+            </p:cNvPicPr>
+            <p:nvPr/>
+          </p:nvPicPr>
+          <p:blipFill>
+            <a:blip r:embed="rId4">
+              <a:extLst>
+                <a:ext uri="{28A0092B-C50C-407E-A947-70E740481C1C}">
+                  <a14:useLocalDpi xmlns:a14="http://schemas.microsoft.com/office/drawing/2010/main" val="0"/>
+                </a:ext>
+              </a:extLst>
+            </a:blip>
+            <a:stretch>
+              <a:fillRect/>
+            </a:stretch>
+          </p:blipFill>
+          <p:spPr>
+            <a:xfrm>
+              <a:off x="1524000" y="0"/>
+              <a:ext cx="9143999" cy="6858000"/>
+            </a:xfrm>
+            <a:prstGeom prst="rect">
+              <a:avLst/>
+            </a:prstGeom>
+          </p:spPr>
+        </p:pic>
+        <p:pic>
+          <p:nvPicPr>
+            <p:cNvPr id="11" name="Imagen 10"/>
+            <p:cNvPicPr>
+              <a:picLocks noChangeAspect="1"/>
+            </p:cNvPicPr>
+            <p:nvPr/>
+          </p:nvPicPr>
+          <p:blipFill rotWithShape="1">
+            <a:blip r:embed="rId5">
+              <a:extLst>
+                <a:ext uri="{BEBA8EAE-BF5A-486C-A8C5-ECC9F3942E4B}">
+                  <a14:imgProps xmlns:a14="http://schemas.microsoft.com/office/drawing/2010/main">
+                    <a14:imgLayer r:embed="rId6">
+                      <a14:imgEffect>
+                        <a14:backgroundRemoval t="72408" b="82250" l="3910" r="90403"/>
+                      </a14:imgEffect>
+                    </a14:imgLayer>
+                  </a14:imgProps>
+                </a:ext>
+                <a:ext uri="{28A0092B-C50C-407E-A947-70E740481C1C}">
+                  <a14:useLocalDpi xmlns:a14="http://schemas.microsoft.com/office/drawing/2010/main" val="0"/>
+                </a:ext>
+              </a:extLst>
+            </a:blip>
+            <a:srcRect l="12480" t="71969" r="13974" b="18512"/>
+            <a:stretch/>
+          </p:blipFill>
+          <p:spPr>
+            <a:xfrm>
+              <a:off x="1881980" y="4531519"/>
+              <a:ext cx="4945063" cy="774700"/>
             </a:xfrm>
             <a:prstGeom prst="rect">
               <a:avLst/>
@@ -3254,7 +4060,65 @@
     </p:spTree>
     <p:extLst>
       <p:ext uri="{BB962C8B-B14F-4D97-AF65-F5344CB8AC3E}">
-        <p14:creationId xmlns:p14="http://schemas.microsoft.com/office/powerpoint/2010/main" val="290116028"/>
+        <p14:creationId xmlns:p14="http://schemas.microsoft.com/office/powerpoint/2010/main" val="3197438527"/>
+      </p:ext>
+    </p:extLst>
+  </p:cSld>
+  <p:clrMapOvr>
+    <a:masterClrMapping/>
+  </p:clrMapOvr>
+</p:sld>
+</file>
+
+<file path=ppt/slides/slide9.xml><?xml version="1.0" encoding="utf-8"?>
+<p:sld xmlns:a="http://schemas.openxmlformats.org/drawingml/2006/main" xmlns:r="http://schemas.openxmlformats.org/officeDocument/2006/relationships" xmlns:p="http://schemas.openxmlformats.org/presentationml/2006/main">
+  <p:cSld>
+    <p:spTree>
+      <p:nvGrpSpPr>
+        <p:cNvPr id="1" name=""/>
+        <p:cNvGrpSpPr/>
+        <p:nvPr/>
+      </p:nvGrpSpPr>
+      <p:grpSpPr>
+        <a:xfrm>
+          <a:off x="0" y="0"/>
+          <a:ext cx="0" cy="0"/>
+          <a:chOff x="0" y="0"/>
+          <a:chExt cx="0" cy="0"/>
+        </a:xfrm>
+      </p:grpSpPr>
+      <p:sp>
+        <p:nvSpPr>
+          <p:cNvPr id="2" name="Título 1"/>
+          <p:cNvSpPr>
+            <a:spLocks noGrp="1"/>
+          </p:cNvSpPr>
+          <p:nvPr>
+            <p:ph type="title"/>
+          </p:nvPr>
+        </p:nvSpPr>
+        <p:spPr>
+          <a:xfrm>
+            <a:off x="5105400" y="2689225"/>
+            <a:ext cx="10515600" cy="1325563"/>
+          </a:xfrm>
+        </p:spPr>
+        <p:txBody>
+          <a:bodyPr/>
+          <a:lstStyle/>
+          <a:p>
+            <a:r>
+              <a:rPr lang="es-MX" dirty="0" smtClean="0"/>
+              <a:t>Plantillas</a:t>
+            </a:r>
+            <a:endParaRPr lang="es-MX" dirty="0"/>
+          </a:p>
+        </p:txBody>
+      </p:sp>
+    </p:spTree>
+    <p:extLst>
+      <p:ext uri="{BB962C8B-B14F-4D97-AF65-F5344CB8AC3E}">
+        <p14:creationId xmlns:p14="http://schemas.microsoft.com/office/powerpoint/2010/main" val="2449795234"/>
       </p:ext>
     </p:extLst>
   </p:cSld>

</xml_diff>